<commit_message>
Update UI for Developer Guide
</commit_message>
<xml_diff>
--- a/docs/diagrams/dashboard.pptx
+++ b/docs/diagrams/dashboard.pptx
@@ -261,7 +261,7 @@
           <a:p>
             <a:fld id="{D5F4EE06-143D-4C2F-8831-1CDA21FFE47B}" type="datetimeFigureOut">
               <a:rPr lang="en-SG" smtClean="0"/>
-              <a:t>23/1/2019</a:t>
+              <a:t>22/2/19</a:t>
             </a:fld>
             <a:endParaRPr lang="en-SG"/>
           </a:p>
@@ -461,7 +461,7 @@
           <a:p>
             <a:fld id="{D5F4EE06-143D-4C2F-8831-1CDA21FFE47B}" type="datetimeFigureOut">
               <a:rPr lang="en-SG" smtClean="0"/>
-              <a:t>23/1/2019</a:t>
+              <a:t>22/2/19</a:t>
             </a:fld>
             <a:endParaRPr lang="en-SG"/>
           </a:p>
@@ -671,7 +671,7 @@
           <a:p>
             <a:fld id="{D5F4EE06-143D-4C2F-8831-1CDA21FFE47B}" type="datetimeFigureOut">
               <a:rPr lang="en-SG" smtClean="0"/>
-              <a:t>23/1/2019</a:t>
+              <a:t>22/2/19</a:t>
             </a:fld>
             <a:endParaRPr lang="en-SG"/>
           </a:p>
@@ -871,7 +871,7 @@
           <a:p>
             <a:fld id="{D5F4EE06-143D-4C2F-8831-1CDA21FFE47B}" type="datetimeFigureOut">
               <a:rPr lang="en-SG" smtClean="0"/>
-              <a:t>23/1/2019</a:t>
+              <a:t>22/2/19</a:t>
             </a:fld>
             <a:endParaRPr lang="en-SG"/>
           </a:p>
@@ -1147,7 +1147,7 @@
           <a:p>
             <a:fld id="{D5F4EE06-143D-4C2F-8831-1CDA21FFE47B}" type="datetimeFigureOut">
               <a:rPr lang="en-SG" smtClean="0"/>
-              <a:t>23/1/2019</a:t>
+              <a:t>22/2/19</a:t>
             </a:fld>
             <a:endParaRPr lang="en-SG"/>
           </a:p>
@@ -1415,7 +1415,7 @@
           <a:p>
             <a:fld id="{D5F4EE06-143D-4C2F-8831-1CDA21FFE47B}" type="datetimeFigureOut">
               <a:rPr lang="en-SG" smtClean="0"/>
-              <a:t>23/1/2019</a:t>
+              <a:t>22/2/19</a:t>
             </a:fld>
             <a:endParaRPr lang="en-SG"/>
           </a:p>
@@ -1830,7 +1830,7 @@
           <a:p>
             <a:fld id="{D5F4EE06-143D-4C2F-8831-1CDA21FFE47B}" type="datetimeFigureOut">
               <a:rPr lang="en-SG" smtClean="0"/>
-              <a:t>23/1/2019</a:t>
+              <a:t>22/2/19</a:t>
             </a:fld>
             <a:endParaRPr lang="en-SG"/>
           </a:p>
@@ -1972,7 +1972,7 @@
           <a:p>
             <a:fld id="{D5F4EE06-143D-4C2F-8831-1CDA21FFE47B}" type="datetimeFigureOut">
               <a:rPr lang="en-SG" smtClean="0"/>
-              <a:t>23/1/2019</a:t>
+              <a:t>22/2/19</a:t>
             </a:fld>
             <a:endParaRPr lang="en-SG"/>
           </a:p>
@@ -2085,7 +2085,7 @@
           <a:p>
             <a:fld id="{D5F4EE06-143D-4C2F-8831-1CDA21FFE47B}" type="datetimeFigureOut">
               <a:rPr lang="en-SG" smtClean="0"/>
-              <a:t>23/1/2019</a:t>
+              <a:t>22/2/19</a:t>
             </a:fld>
             <a:endParaRPr lang="en-SG"/>
           </a:p>
@@ -2398,7 +2398,7 @@
           <a:p>
             <a:fld id="{D5F4EE06-143D-4C2F-8831-1CDA21FFE47B}" type="datetimeFigureOut">
               <a:rPr lang="en-SG" smtClean="0"/>
-              <a:t>23/1/2019</a:t>
+              <a:t>22/2/19</a:t>
             </a:fld>
             <a:endParaRPr lang="en-SG"/>
           </a:p>
@@ -2687,7 +2687,7 @@
           <a:p>
             <a:fld id="{D5F4EE06-143D-4C2F-8831-1CDA21FFE47B}" type="datetimeFigureOut">
               <a:rPr lang="en-SG" smtClean="0"/>
-              <a:t>23/1/2019</a:t>
+              <a:t>22/2/19</a:t>
             </a:fld>
             <a:endParaRPr lang="en-SG"/>
           </a:p>
@@ -2930,7 +2930,7 @@
           <a:p>
             <a:fld id="{D5F4EE06-143D-4C2F-8831-1CDA21FFE47B}" type="datetimeFigureOut">
               <a:rPr lang="en-SG" smtClean="0"/>
-              <a:t>23/1/2019</a:t>
+              <a:t>22/2/19</a:t>
             </a:fld>
             <a:endParaRPr lang="en-SG"/>
           </a:p>
@@ -3349,10 +3349,10 @@
       </p:grpSpPr>
       <p:pic>
         <p:nvPicPr>
-          <p:cNvPr id="3" name="图片 2">
-            <a:extLst>
-              <a:ext uri="{FF2B5EF4-FFF2-40B4-BE49-F238E27FC236}">
-                <a16:creationId xmlns:a16="http://schemas.microsoft.com/office/drawing/2014/main" id="{078C2DC3-05AE-4DBC-A6D6-2BF0D2EFA39D}"/>
+          <p:cNvPr id="5" name="Picture 4">
+            <a:extLst>
+              <a:ext uri="{FF2B5EF4-FFF2-40B4-BE49-F238E27FC236}">
+                <a16:creationId xmlns:a16="http://schemas.microsoft.com/office/drawing/2014/main" id="{0D954123-975A-3A42-A7F9-E3AC583847B8}"/>
               </a:ext>
             </a:extLst>
           </p:cNvPr>
@@ -3375,8 +3375,8 @@
         </p:blipFill>
         <p:spPr>
           <a:xfrm>
-            <a:off x="1328690" y="1084298"/>
-            <a:ext cx="9534617" cy="4689403"/>
+            <a:off x="1305076" y="901373"/>
+            <a:ext cx="9487249" cy="4671748"/>
           </a:xfrm>
           <a:prstGeom prst="rect">
             <a:avLst/>
@@ -3406,7 +3406,7 @@
         <p:spPr>
           <a:xfrm>
             <a:off x="1064377" y="379679"/>
-            <a:ext cx="10063244" cy="704619"/>
+            <a:ext cx="9979368" cy="704619"/>
           </a:xfrm>
           <a:prstGeom prst="rect">
             <a:avLst/>
@@ -3427,7 +3427,7 @@
         </p:nvSpPr>
         <p:spPr>
           <a:xfrm>
-            <a:off x="1171853" y="1084298"/>
+            <a:off x="1080115" y="991630"/>
             <a:ext cx="5015884" cy="646331"/>
           </a:xfrm>
           <a:prstGeom prst="rect">
@@ -3443,11 +3443,11 @@
           <a:p>
             <a:r>
               <a:rPr lang="en-US" altLang="zh-CN" sz="3600" b="1" dirty="0"/>
-              <a:t>{</a:t>
+              <a:t>  {</a:t>
             </a:r>
             <a:r>
               <a:rPr lang="en-US" altLang="zh-CN" sz="3600" dirty="0"/>
-              <a:t>                                            </a:t>
+              <a:t>                                          </a:t>
             </a:r>
             <a:r>
               <a:rPr lang="en-US" altLang="zh-CN" sz="3600" b="1" dirty="0"/>
@@ -3522,15 +3522,15 @@
           <a:lstStyle/>
           <a:p>
             <a:r>
-              <a:rPr lang="en-US" altLang="zh-CN" sz="3600" b="1" dirty="0"/>
+              <a:rPr lang="en-US" altLang="zh-CN" sz="3600" b="1"/>
               <a:t>{</a:t>
             </a:r>
             <a:r>
-              <a:rPr lang="en-US" altLang="zh-CN" sz="3600" dirty="0"/>
-              <a:t>                                            </a:t>
-            </a:r>
-            <a:r>
-              <a:rPr lang="en-US" altLang="zh-CN" sz="3600" b="1" dirty="0"/>
+              <a:rPr lang="en-US" altLang="zh-CN" sz="3600"/>
+              <a:t>                                           </a:t>
+            </a:r>
+            <a:r>
+              <a:rPr lang="en-US" altLang="zh-CN" sz="3600" b="1"/>
               <a:t>}</a:t>
             </a:r>
             <a:endParaRPr lang="zh-CN" altLang="en-US" sz="3600" b="1" dirty="0"/>
@@ -3551,8 +3551,8 @@
         </p:nvSpPr>
         <p:spPr>
           <a:xfrm>
-            <a:off x="1608338" y="1932126"/>
-            <a:ext cx="1535836" cy="338554"/>
+            <a:off x="1385074" y="1932126"/>
+            <a:ext cx="1513234" cy="338554"/>
           </a:xfrm>
           <a:prstGeom prst="rect">
             <a:avLst/>
@@ -3670,8 +3670,8 @@
         </p:nvCxnSpPr>
         <p:spPr>
           <a:xfrm flipH="1" flipV="1">
-            <a:off x="3506679" y="4128408"/>
-            <a:ext cx="675981" cy="298808"/>
+            <a:off x="2898308" y="4188346"/>
+            <a:ext cx="623065" cy="249554"/>
           </a:xfrm>
           <a:prstGeom prst="straightConnector1">
             <a:avLst/>
@@ -3751,7 +3751,7 @@
         </p:nvCxnSpPr>
         <p:spPr>
           <a:xfrm flipH="1" flipV="1">
-            <a:off x="2752281" y="3747764"/>
+            <a:off x="2766975" y="3802472"/>
             <a:ext cx="754398" cy="95995"/>
           </a:xfrm>
           <a:prstGeom prst="straightConnector1">
@@ -3790,8 +3790,8 @@
         </p:nvSpPr>
         <p:spPr>
           <a:xfrm>
-            <a:off x="3423822" y="3665689"/>
-            <a:ext cx="2522736" cy="369332"/>
+            <a:off x="3472062" y="3713801"/>
+            <a:ext cx="3788273" cy="369332"/>
           </a:xfrm>
           <a:prstGeom prst="rect">
             <a:avLst/>
@@ -3908,9 +3908,9 @@
           <p:nvPr/>
         </p:nvCxnSpPr>
         <p:spPr>
-          <a:xfrm flipH="1" flipV="1">
-            <a:off x="10206463" y="1965638"/>
-            <a:ext cx="754398" cy="95995"/>
+          <a:xfrm flipH="1">
+            <a:off x="8740270" y="2146335"/>
+            <a:ext cx="743681" cy="1"/>
           </a:xfrm>
           <a:prstGeom prst="straightConnector1">
             <a:avLst/>
@@ -3948,7 +3948,7 @@
         </p:nvSpPr>
         <p:spPr>
           <a:xfrm>
-            <a:off x="10947545" y="1855779"/>
+            <a:off x="9483951" y="1977058"/>
             <a:ext cx="646691" cy="338554"/>
           </a:xfrm>
           <a:prstGeom prst="rect">
@@ -3965,6 +3965,83 @@
             <a:r>
               <a:rPr lang="en-US" altLang="zh-CN" sz="1600" dirty="0"/>
               <a:t>title</a:t>
+            </a:r>
+            <a:endParaRPr lang="zh-CN" altLang="en-US" sz="1600" dirty="0"/>
+          </a:p>
+        </p:txBody>
+      </p:sp>
+      <p:cxnSp>
+        <p:nvCxnSpPr>
+          <p:cNvPr id="22" name="直接箭头连接符 45">
+            <a:extLst>
+              <a:ext uri="{FF2B5EF4-FFF2-40B4-BE49-F238E27FC236}">
+                <a16:creationId xmlns:a16="http://schemas.microsoft.com/office/drawing/2014/main" id="{6277504A-AF5B-AE43-8282-3FC382F853CA}"/>
+              </a:ext>
+            </a:extLst>
+          </p:cNvPr>
+          <p:cNvCxnSpPr>
+            <a:cxnSpLocks/>
+          </p:cNvCxnSpPr>
+          <p:nvPr/>
+        </p:nvCxnSpPr>
+        <p:spPr>
+          <a:xfrm flipH="1">
+            <a:off x="8368429" y="1778237"/>
+            <a:ext cx="743681" cy="1"/>
+          </a:xfrm>
+          <a:prstGeom prst="straightConnector1">
+            <a:avLst/>
+          </a:prstGeom>
+          <a:ln w="28575">
+            <a:tailEnd type="triangle"/>
+          </a:ln>
+        </p:spPr>
+        <p:style>
+          <a:lnRef idx="1">
+            <a:schemeClr val="dk1"/>
+          </a:lnRef>
+          <a:fillRef idx="0">
+            <a:schemeClr val="dk1"/>
+          </a:fillRef>
+          <a:effectRef idx="0">
+            <a:schemeClr val="dk1"/>
+          </a:effectRef>
+          <a:fontRef idx="minor">
+            <a:schemeClr val="tx1"/>
+          </a:fontRef>
+        </p:style>
+      </p:cxnSp>
+      <p:sp>
+        <p:nvSpPr>
+          <p:cNvPr id="23" name="文本框 46">
+            <a:extLst>
+              <a:ext uri="{FF2B5EF4-FFF2-40B4-BE49-F238E27FC236}">
+                <a16:creationId xmlns:a16="http://schemas.microsoft.com/office/drawing/2014/main" id="{E9E7343E-077D-3B43-92A7-61FB56C09A47}"/>
+              </a:ext>
+            </a:extLst>
+          </p:cNvPr>
+          <p:cNvSpPr txBox="1"/>
+          <p:nvPr/>
+        </p:nvSpPr>
+        <p:spPr>
+          <a:xfrm>
+            <a:off x="9112110" y="1593572"/>
+            <a:ext cx="1111828" cy="338554"/>
+          </a:xfrm>
+          <a:prstGeom prst="rect">
+            <a:avLst/>
+          </a:prstGeom>
+          <a:noFill/>
+        </p:spPr>
+        <p:txBody>
+          <a:bodyPr wrap="square" rtlCol="0">
+            <a:spAutoFit/>
+          </a:bodyPr>
+          <a:lstStyle/>
+          <a:p>
+            <a:r>
+              <a:rPr lang="en-US" altLang="zh-CN" sz="1600" dirty="0"/>
+              <a:t>glob filter</a:t>
             </a:r>
             <a:endParaRPr lang="zh-CN" altLang="en-US" sz="1600" dirty="0"/>
           </a:p>

</xml_diff>

<commit_message>
[#504] CodeView: add glob pattern search box (#532)
The addition of #170 provides users with the convenience of filtering
the files in code view by formats using tick boxes. However, this does
not solve the problem of finding specific file(s) by name, folder or
path.

As a solution, let's add a search box to provide users with an
additional option of filtering files by glob patterns. E.g.
**/test/*.java.
</commit_message>
<xml_diff>
--- a/docs/diagrams/dashboard.pptx
+++ b/docs/diagrams/dashboard.pptx
@@ -261,7 +261,7 @@
           <a:p>
             <a:fld id="{D5F4EE06-143D-4C2F-8831-1CDA21FFE47B}" type="datetimeFigureOut">
               <a:rPr lang="en-SG" smtClean="0"/>
-              <a:t>23/1/2019</a:t>
+              <a:t>22/2/19</a:t>
             </a:fld>
             <a:endParaRPr lang="en-SG"/>
           </a:p>
@@ -461,7 +461,7 @@
           <a:p>
             <a:fld id="{D5F4EE06-143D-4C2F-8831-1CDA21FFE47B}" type="datetimeFigureOut">
               <a:rPr lang="en-SG" smtClean="0"/>
-              <a:t>23/1/2019</a:t>
+              <a:t>22/2/19</a:t>
             </a:fld>
             <a:endParaRPr lang="en-SG"/>
           </a:p>
@@ -671,7 +671,7 @@
           <a:p>
             <a:fld id="{D5F4EE06-143D-4C2F-8831-1CDA21FFE47B}" type="datetimeFigureOut">
               <a:rPr lang="en-SG" smtClean="0"/>
-              <a:t>23/1/2019</a:t>
+              <a:t>22/2/19</a:t>
             </a:fld>
             <a:endParaRPr lang="en-SG"/>
           </a:p>
@@ -871,7 +871,7 @@
           <a:p>
             <a:fld id="{D5F4EE06-143D-4C2F-8831-1CDA21FFE47B}" type="datetimeFigureOut">
               <a:rPr lang="en-SG" smtClean="0"/>
-              <a:t>23/1/2019</a:t>
+              <a:t>22/2/19</a:t>
             </a:fld>
             <a:endParaRPr lang="en-SG"/>
           </a:p>
@@ -1147,7 +1147,7 @@
           <a:p>
             <a:fld id="{D5F4EE06-143D-4C2F-8831-1CDA21FFE47B}" type="datetimeFigureOut">
               <a:rPr lang="en-SG" smtClean="0"/>
-              <a:t>23/1/2019</a:t>
+              <a:t>22/2/19</a:t>
             </a:fld>
             <a:endParaRPr lang="en-SG"/>
           </a:p>
@@ -1415,7 +1415,7 @@
           <a:p>
             <a:fld id="{D5F4EE06-143D-4C2F-8831-1CDA21FFE47B}" type="datetimeFigureOut">
               <a:rPr lang="en-SG" smtClean="0"/>
-              <a:t>23/1/2019</a:t>
+              <a:t>22/2/19</a:t>
             </a:fld>
             <a:endParaRPr lang="en-SG"/>
           </a:p>
@@ -1830,7 +1830,7 @@
           <a:p>
             <a:fld id="{D5F4EE06-143D-4C2F-8831-1CDA21FFE47B}" type="datetimeFigureOut">
               <a:rPr lang="en-SG" smtClean="0"/>
-              <a:t>23/1/2019</a:t>
+              <a:t>22/2/19</a:t>
             </a:fld>
             <a:endParaRPr lang="en-SG"/>
           </a:p>
@@ -1972,7 +1972,7 @@
           <a:p>
             <a:fld id="{D5F4EE06-143D-4C2F-8831-1CDA21FFE47B}" type="datetimeFigureOut">
               <a:rPr lang="en-SG" smtClean="0"/>
-              <a:t>23/1/2019</a:t>
+              <a:t>22/2/19</a:t>
             </a:fld>
             <a:endParaRPr lang="en-SG"/>
           </a:p>
@@ -2085,7 +2085,7 @@
           <a:p>
             <a:fld id="{D5F4EE06-143D-4C2F-8831-1CDA21FFE47B}" type="datetimeFigureOut">
               <a:rPr lang="en-SG" smtClean="0"/>
-              <a:t>23/1/2019</a:t>
+              <a:t>22/2/19</a:t>
             </a:fld>
             <a:endParaRPr lang="en-SG"/>
           </a:p>
@@ -2398,7 +2398,7 @@
           <a:p>
             <a:fld id="{D5F4EE06-143D-4C2F-8831-1CDA21FFE47B}" type="datetimeFigureOut">
               <a:rPr lang="en-SG" smtClean="0"/>
-              <a:t>23/1/2019</a:t>
+              <a:t>22/2/19</a:t>
             </a:fld>
             <a:endParaRPr lang="en-SG"/>
           </a:p>
@@ -2687,7 +2687,7 @@
           <a:p>
             <a:fld id="{D5F4EE06-143D-4C2F-8831-1CDA21FFE47B}" type="datetimeFigureOut">
               <a:rPr lang="en-SG" smtClean="0"/>
-              <a:t>23/1/2019</a:t>
+              <a:t>22/2/19</a:t>
             </a:fld>
             <a:endParaRPr lang="en-SG"/>
           </a:p>
@@ -2930,7 +2930,7 @@
           <a:p>
             <a:fld id="{D5F4EE06-143D-4C2F-8831-1CDA21FFE47B}" type="datetimeFigureOut">
               <a:rPr lang="en-SG" smtClean="0"/>
-              <a:t>23/1/2019</a:t>
+              <a:t>22/2/19</a:t>
             </a:fld>
             <a:endParaRPr lang="en-SG"/>
           </a:p>
@@ -3349,10 +3349,10 @@
       </p:grpSpPr>
       <p:pic>
         <p:nvPicPr>
-          <p:cNvPr id="3" name="图片 2">
-            <a:extLst>
-              <a:ext uri="{FF2B5EF4-FFF2-40B4-BE49-F238E27FC236}">
-                <a16:creationId xmlns:a16="http://schemas.microsoft.com/office/drawing/2014/main" id="{078C2DC3-05AE-4DBC-A6D6-2BF0D2EFA39D}"/>
+          <p:cNvPr id="5" name="Picture 4">
+            <a:extLst>
+              <a:ext uri="{FF2B5EF4-FFF2-40B4-BE49-F238E27FC236}">
+                <a16:creationId xmlns:a16="http://schemas.microsoft.com/office/drawing/2014/main" id="{0D954123-975A-3A42-A7F9-E3AC583847B8}"/>
               </a:ext>
             </a:extLst>
           </p:cNvPr>
@@ -3375,8 +3375,8 @@
         </p:blipFill>
         <p:spPr>
           <a:xfrm>
-            <a:off x="1328690" y="1084298"/>
-            <a:ext cx="9534617" cy="4689403"/>
+            <a:off x="1305076" y="901373"/>
+            <a:ext cx="9487249" cy="4671748"/>
           </a:xfrm>
           <a:prstGeom prst="rect">
             <a:avLst/>
@@ -3406,7 +3406,7 @@
         <p:spPr>
           <a:xfrm>
             <a:off x="1064377" y="379679"/>
-            <a:ext cx="10063244" cy="704619"/>
+            <a:ext cx="9979368" cy="704619"/>
           </a:xfrm>
           <a:prstGeom prst="rect">
             <a:avLst/>
@@ -3427,7 +3427,7 @@
         </p:nvSpPr>
         <p:spPr>
           <a:xfrm>
-            <a:off x="1171853" y="1084298"/>
+            <a:off x="1080115" y="991630"/>
             <a:ext cx="5015884" cy="646331"/>
           </a:xfrm>
           <a:prstGeom prst="rect">
@@ -3443,11 +3443,11 @@
           <a:p>
             <a:r>
               <a:rPr lang="en-US" altLang="zh-CN" sz="3600" b="1" dirty="0"/>
-              <a:t>{</a:t>
+              <a:t>  {</a:t>
             </a:r>
             <a:r>
               <a:rPr lang="en-US" altLang="zh-CN" sz="3600" dirty="0"/>
-              <a:t>                                            </a:t>
+              <a:t>                                          </a:t>
             </a:r>
             <a:r>
               <a:rPr lang="en-US" altLang="zh-CN" sz="3600" b="1" dirty="0"/>
@@ -3522,15 +3522,15 @@
           <a:lstStyle/>
           <a:p>
             <a:r>
-              <a:rPr lang="en-US" altLang="zh-CN" sz="3600" b="1" dirty="0"/>
+              <a:rPr lang="en-US" altLang="zh-CN" sz="3600" b="1"/>
               <a:t>{</a:t>
             </a:r>
             <a:r>
-              <a:rPr lang="en-US" altLang="zh-CN" sz="3600" dirty="0"/>
-              <a:t>                                            </a:t>
-            </a:r>
-            <a:r>
-              <a:rPr lang="en-US" altLang="zh-CN" sz="3600" b="1" dirty="0"/>
+              <a:rPr lang="en-US" altLang="zh-CN" sz="3600"/>
+              <a:t>                                           </a:t>
+            </a:r>
+            <a:r>
+              <a:rPr lang="en-US" altLang="zh-CN" sz="3600" b="1"/>
               <a:t>}</a:t>
             </a:r>
             <a:endParaRPr lang="zh-CN" altLang="en-US" sz="3600" b="1" dirty="0"/>
@@ -3551,8 +3551,8 @@
         </p:nvSpPr>
         <p:spPr>
           <a:xfrm>
-            <a:off x="1608338" y="1932126"/>
-            <a:ext cx="1535836" cy="338554"/>
+            <a:off x="1385074" y="1932126"/>
+            <a:ext cx="1513234" cy="338554"/>
           </a:xfrm>
           <a:prstGeom prst="rect">
             <a:avLst/>
@@ -3670,8 +3670,8 @@
         </p:nvCxnSpPr>
         <p:spPr>
           <a:xfrm flipH="1" flipV="1">
-            <a:off x="3506679" y="4128408"/>
-            <a:ext cx="675981" cy="298808"/>
+            <a:off x="2898308" y="4188346"/>
+            <a:ext cx="623065" cy="249554"/>
           </a:xfrm>
           <a:prstGeom prst="straightConnector1">
             <a:avLst/>
@@ -3751,7 +3751,7 @@
         </p:nvCxnSpPr>
         <p:spPr>
           <a:xfrm flipH="1" flipV="1">
-            <a:off x="2752281" y="3747764"/>
+            <a:off x="2766975" y="3802472"/>
             <a:ext cx="754398" cy="95995"/>
           </a:xfrm>
           <a:prstGeom prst="straightConnector1">
@@ -3790,8 +3790,8 @@
         </p:nvSpPr>
         <p:spPr>
           <a:xfrm>
-            <a:off x="3423822" y="3665689"/>
-            <a:ext cx="2522736" cy="369332"/>
+            <a:off x="3472062" y="3713801"/>
+            <a:ext cx="3788273" cy="369332"/>
           </a:xfrm>
           <a:prstGeom prst="rect">
             <a:avLst/>
@@ -3908,9 +3908,9 @@
           <p:nvPr/>
         </p:nvCxnSpPr>
         <p:spPr>
-          <a:xfrm flipH="1" flipV="1">
-            <a:off x="10206463" y="1965638"/>
-            <a:ext cx="754398" cy="95995"/>
+          <a:xfrm flipH="1">
+            <a:off x="8740270" y="2146335"/>
+            <a:ext cx="743681" cy="1"/>
           </a:xfrm>
           <a:prstGeom prst="straightConnector1">
             <a:avLst/>
@@ -3948,7 +3948,7 @@
         </p:nvSpPr>
         <p:spPr>
           <a:xfrm>
-            <a:off x="10947545" y="1855779"/>
+            <a:off x="9483951" y="1977058"/>
             <a:ext cx="646691" cy="338554"/>
           </a:xfrm>
           <a:prstGeom prst="rect">
@@ -3965,6 +3965,83 @@
             <a:r>
               <a:rPr lang="en-US" altLang="zh-CN" sz="1600" dirty="0"/>
               <a:t>title</a:t>
+            </a:r>
+            <a:endParaRPr lang="zh-CN" altLang="en-US" sz="1600" dirty="0"/>
+          </a:p>
+        </p:txBody>
+      </p:sp>
+      <p:cxnSp>
+        <p:nvCxnSpPr>
+          <p:cNvPr id="22" name="直接箭头连接符 45">
+            <a:extLst>
+              <a:ext uri="{FF2B5EF4-FFF2-40B4-BE49-F238E27FC236}">
+                <a16:creationId xmlns:a16="http://schemas.microsoft.com/office/drawing/2014/main" id="{6277504A-AF5B-AE43-8282-3FC382F853CA}"/>
+              </a:ext>
+            </a:extLst>
+          </p:cNvPr>
+          <p:cNvCxnSpPr>
+            <a:cxnSpLocks/>
+          </p:cNvCxnSpPr>
+          <p:nvPr/>
+        </p:nvCxnSpPr>
+        <p:spPr>
+          <a:xfrm flipH="1">
+            <a:off x="8368429" y="1778237"/>
+            <a:ext cx="743681" cy="1"/>
+          </a:xfrm>
+          <a:prstGeom prst="straightConnector1">
+            <a:avLst/>
+          </a:prstGeom>
+          <a:ln w="28575">
+            <a:tailEnd type="triangle"/>
+          </a:ln>
+        </p:spPr>
+        <p:style>
+          <a:lnRef idx="1">
+            <a:schemeClr val="dk1"/>
+          </a:lnRef>
+          <a:fillRef idx="0">
+            <a:schemeClr val="dk1"/>
+          </a:fillRef>
+          <a:effectRef idx="0">
+            <a:schemeClr val="dk1"/>
+          </a:effectRef>
+          <a:fontRef idx="minor">
+            <a:schemeClr val="tx1"/>
+          </a:fontRef>
+        </p:style>
+      </p:cxnSp>
+      <p:sp>
+        <p:nvSpPr>
+          <p:cNvPr id="23" name="文本框 46">
+            <a:extLst>
+              <a:ext uri="{FF2B5EF4-FFF2-40B4-BE49-F238E27FC236}">
+                <a16:creationId xmlns:a16="http://schemas.microsoft.com/office/drawing/2014/main" id="{E9E7343E-077D-3B43-92A7-61FB56C09A47}"/>
+              </a:ext>
+            </a:extLst>
+          </p:cNvPr>
+          <p:cNvSpPr txBox="1"/>
+          <p:nvPr/>
+        </p:nvSpPr>
+        <p:spPr>
+          <a:xfrm>
+            <a:off x="9112110" y="1593572"/>
+            <a:ext cx="1111828" cy="338554"/>
+          </a:xfrm>
+          <a:prstGeom prst="rect">
+            <a:avLst/>
+          </a:prstGeom>
+          <a:noFill/>
+        </p:spPr>
+        <p:txBody>
+          <a:bodyPr wrap="square" rtlCol="0">
+            <a:spAutoFit/>
+          </a:bodyPr>
+          <a:lstStyle/>
+          <a:p>
+            <a:r>
+              <a:rPr lang="en-US" altLang="zh-CN" sz="1600" dirty="0"/>
+              <a:t>glob filter</a:t>
             </a:r>
             <a:endParaRPr lang="zh-CN" altLang="en-US" sz="1600" dirty="0"/>
           </a:p>

</xml_diff>